<commit_message>
Update slides a bit for weekly meeting
</commit_message>
<xml_diff>
--- a/presentations/weekly_meetings/4_4_24.pptx
+++ b/presentations/weekly_meetings/4_4_24.pptx
@@ -221,7 +221,7 @@
           <a:p>
             <a:fld id="{E933A773-0DCE-3544-BB67-D5FA58DF903C}" type="datetimeFigureOut">
               <a:rPr lang="en-US" smtClean="0"/>
-              <a:t>4/3/24</a:t>
+              <a:t>4/4/24</a:t>
             </a:fld>
             <a:endParaRPr lang="en-US"/>
           </a:p>
@@ -3563,7 +3563,7 @@
           <a:p>
             <a:fld id="{80FC6068-BAFB-FC44-B9D8-F4B3BB105DE6}" type="datetimeFigureOut">
               <a:rPr lang="en-US" smtClean="0"/>
-              <a:t>4/3/24</a:t>
+              <a:t>4/4/24</a:t>
             </a:fld>
             <a:endParaRPr lang="en-US"/>
           </a:p>
@@ -3761,7 +3761,7 @@
           <a:p>
             <a:fld id="{80FC6068-BAFB-FC44-B9D8-F4B3BB105DE6}" type="datetimeFigureOut">
               <a:rPr lang="en-US" smtClean="0"/>
-              <a:t>4/3/24</a:t>
+              <a:t>4/4/24</a:t>
             </a:fld>
             <a:endParaRPr lang="en-US"/>
           </a:p>
@@ -3969,7 +3969,7 @@
           <a:p>
             <a:fld id="{80FC6068-BAFB-FC44-B9D8-F4B3BB105DE6}" type="datetimeFigureOut">
               <a:rPr lang="en-US" smtClean="0"/>
-              <a:t>4/3/24</a:t>
+              <a:t>4/4/24</a:t>
             </a:fld>
             <a:endParaRPr lang="en-US"/>
           </a:p>
@@ -4173,7 +4173,7 @@
           <a:p>
             <a:fld id="{80FC6068-BAFB-FC44-B9D8-F4B3BB105DE6}" type="datetimeFigureOut">
               <a:rPr lang="en-US" smtClean="0"/>
-              <a:t>4/3/24</a:t>
+              <a:t>4/4/24</a:t>
             </a:fld>
             <a:endParaRPr lang="en-US"/>
           </a:p>
@@ -4464,7 +4464,7 @@
           <a:p>
             <a:fld id="{80FC6068-BAFB-FC44-B9D8-F4B3BB105DE6}" type="datetimeFigureOut">
               <a:rPr lang="en-US" smtClean="0"/>
-              <a:t>4/3/24</a:t>
+              <a:t>4/4/24</a:t>
             </a:fld>
             <a:endParaRPr lang="en-US"/>
           </a:p>
@@ -4729,7 +4729,7 @@
           <a:p>
             <a:fld id="{80FC6068-BAFB-FC44-B9D8-F4B3BB105DE6}" type="datetimeFigureOut">
               <a:rPr lang="en-US" smtClean="0"/>
-              <a:t>4/3/24</a:t>
+              <a:t>4/4/24</a:t>
             </a:fld>
             <a:endParaRPr lang="en-US"/>
           </a:p>
@@ -5141,7 +5141,7 @@
           <a:p>
             <a:fld id="{80FC6068-BAFB-FC44-B9D8-F4B3BB105DE6}" type="datetimeFigureOut">
               <a:rPr lang="en-US" smtClean="0"/>
-              <a:t>4/3/24</a:t>
+              <a:t>4/4/24</a:t>
             </a:fld>
             <a:endParaRPr lang="en-US"/>
           </a:p>
@@ -5282,7 +5282,7 @@
           <a:p>
             <a:fld id="{80FC6068-BAFB-FC44-B9D8-F4B3BB105DE6}" type="datetimeFigureOut">
               <a:rPr lang="en-US" smtClean="0"/>
-              <a:t>4/3/24</a:t>
+              <a:t>4/4/24</a:t>
             </a:fld>
             <a:endParaRPr lang="en-US"/>
           </a:p>
@@ -5395,7 +5395,7 @@
           <a:p>
             <a:fld id="{80FC6068-BAFB-FC44-B9D8-F4B3BB105DE6}" type="datetimeFigureOut">
               <a:rPr lang="en-US" smtClean="0"/>
-              <a:t>4/3/24</a:t>
+              <a:t>4/4/24</a:t>
             </a:fld>
             <a:endParaRPr lang="en-US"/>
           </a:p>
@@ -5706,7 +5706,7 @@
           <a:p>
             <a:fld id="{80FC6068-BAFB-FC44-B9D8-F4B3BB105DE6}" type="datetimeFigureOut">
               <a:rPr lang="en-US" smtClean="0"/>
-              <a:t>4/3/24</a:t>
+              <a:t>4/4/24</a:t>
             </a:fld>
             <a:endParaRPr lang="en-US"/>
           </a:p>
@@ -5994,7 +5994,7 @@
           <a:p>
             <a:fld id="{80FC6068-BAFB-FC44-B9D8-F4B3BB105DE6}" type="datetimeFigureOut">
               <a:rPr lang="en-US" smtClean="0"/>
-              <a:t>4/3/24</a:t>
+              <a:t>4/4/24</a:t>
             </a:fld>
             <a:endParaRPr lang="en-US"/>
           </a:p>
@@ -6235,7 +6235,7 @@
           <a:p>
             <a:fld id="{80FC6068-BAFB-FC44-B9D8-F4B3BB105DE6}" type="datetimeFigureOut">
               <a:rPr lang="en-US" smtClean="0"/>
-              <a:t>4/3/24</a:t>
+              <a:t>4/4/24</a:t>
             </a:fld>
             <a:endParaRPr lang="en-US"/>
           </a:p>
@@ -7158,7 +7158,7 @@
             </a:r>
             <a:r>
               <a:rPr lang="en-US" dirty="0"/>
-              <a:t> QC: generally good, may exclude few samples from subsequent analyses</a:t>
+              <a:t> QC: generally good, may exclude few samples from subsequent analyses, still conferring with Stephan for advice</a:t>
             </a:r>
           </a:p>
           <a:p>
@@ -7215,16 +7215,6 @@
             <a:r>
               <a:rPr lang="en-US" dirty="0"/>
               <a:t>Ran peak caller on merged alignment files</a:t>
-            </a:r>
-          </a:p>
-          <a:p>
-            <a:pPr marL="971550" lvl="1" indent="-514350">
-              <a:buFont typeface="+mj-lt"/>
-              <a:buAutoNum type="alphaLcParenR"/>
-            </a:pPr>
-            <a:r>
-              <a:rPr lang="en-US" dirty="0"/>
-              <a:t>TODO: differentially accessible gene analysis (volcano plot comparison)</a:t>
             </a:r>
           </a:p>
         </p:txBody>
@@ -7338,7 +7328,25 @@
             </a:r>
             <a:r>
               <a:rPr lang="en-US" dirty="0"/>
-              <a:t>: merging alignment files, calling peaks on aligned files, making volcano plots</a:t>
+              <a:t>: excluding libraries that failed QC, merging alignment files, calling peaks on aligned files, differentially accessible gene analysis (volcano plot comparison)</a:t>
+            </a:r>
+          </a:p>
+          <a:p>
+            <a:pPr marL="514350" indent="-514350">
+              <a:buFont typeface="+mj-lt"/>
+              <a:buAutoNum type="arabicPeriod"/>
+            </a:pPr>
+            <a:r>
+              <a:rPr lang="en-US" dirty="0"/>
+              <a:t>Erin’s </a:t>
+            </a:r>
+            <a:r>
+              <a:rPr lang="en-US" dirty="0" err="1"/>
+              <a:t>ATACseq</a:t>
+            </a:r>
+            <a:r>
+              <a:rPr lang="en-US" dirty="0"/>
+              <a:t> data: differentially accessible gene analysis (volcano plot comparison)</a:t>
             </a:r>
           </a:p>
           <a:p>
@@ -8010,7 +8018,7 @@
           <a:p>
             <a:r>
               <a:rPr lang="en-US" dirty="0"/>
-              <a:t>Average Connectivity: 1.029762</a:t>
+              <a:t>Average Connectivity: 1.03</a:t>
             </a:r>
           </a:p>
           <a:p>
@@ -8057,7 +8065,7 @@
           <a:p>
             <a:r>
               <a:rPr lang="en-US" dirty="0"/>
-              <a:t>Average Connectivity: 1.258687</a:t>
+              <a:t>Average Connectivity: 1.26</a:t>
             </a:r>
           </a:p>
           <a:p>

</xml_diff>